<commit_message>
Tue Aug 26 Material
</commit_message>
<xml_diff>
--- a/Teaching/Chemistry/FCC Chem 3A Expt 1a Making Measurements.pptx
+++ b/Teaching/Chemistry/FCC Chem 3A Expt 1a Making Measurements.pptx
@@ -5,7 +5,7 @@
     <p:sldMasterId id="2147483803" r:id="rId1"/>
   </p:sldMasterIdLst>
   <p:notesMasterIdLst>
-    <p:notesMasterId r:id="rId10"/>
+    <p:notesMasterId r:id="rId16"/>
   </p:notesMasterIdLst>
   <p:sldIdLst>
     <p:sldId id="608" r:id="rId2"/>
@@ -16,6 +16,12 @@
     <p:sldId id="614" r:id="rId7"/>
     <p:sldId id="610" r:id="rId8"/>
     <p:sldId id="612" r:id="rId9"/>
+    <p:sldId id="619" r:id="rId10"/>
+    <p:sldId id="623" r:id="rId11"/>
+    <p:sldId id="618" r:id="rId12"/>
+    <p:sldId id="620" r:id="rId13"/>
+    <p:sldId id="621" r:id="rId14"/>
+    <p:sldId id="622" r:id="rId15"/>
   </p:sldIdLst>
   <p:sldSz cx="9144000" cy="6858000" type="screen4x3"/>
   <p:notesSz cx="7315200" cy="9601200"/>
@@ -10468,6 +10474,1367 @@
         </p:txBody>
       </p:sp>
     </p:spTree>
+  </p:cSld>
+  <p:clrMapOvr>
+    <a:masterClrMapping/>
+  </p:clrMapOvr>
+</p:sld>
+</file>
+
+<file path=ppt/slides/slide10.xml><?xml version="1.0" encoding="utf-8"?>
+<p:sld xmlns:a="http://schemas.openxmlformats.org/drawingml/2006/main" xmlns:r="http://schemas.openxmlformats.org/officeDocument/2006/relationships" xmlns:p="http://schemas.openxmlformats.org/presentationml/2006/main">
+  <p:cSld>
+    <p:spTree>
+      <p:nvGrpSpPr>
+        <p:cNvPr id="1" name="">
+          <a:extLst>
+            <a:ext uri="{FF2B5EF4-FFF2-40B4-BE49-F238E27FC236}">
+              <a16:creationId xmlns:a16="http://schemas.microsoft.com/office/drawing/2014/main" id="{6D0D161A-791C-435F-CC1B-95278D83B841}"/>
+            </a:ext>
+          </a:extLst>
+        </p:cNvPr>
+        <p:cNvGrpSpPr/>
+        <p:nvPr/>
+      </p:nvGrpSpPr>
+      <p:grpSpPr>
+        <a:xfrm>
+          <a:off x="0" y="0"/>
+          <a:ext cx="0" cy="0"/>
+          <a:chOff x="0" y="0"/>
+          <a:chExt cx="0" cy="0"/>
+        </a:xfrm>
+      </p:grpSpPr>
+      <p:sp>
+        <p:nvSpPr>
+          <p:cNvPr id="2" name="Title 1">
+            <a:extLst>
+              <a:ext uri="{FF2B5EF4-FFF2-40B4-BE49-F238E27FC236}">
+                <a16:creationId xmlns:a16="http://schemas.microsoft.com/office/drawing/2014/main" id="{5A19465F-9974-8522-A69D-16C584C28A3B}"/>
+              </a:ext>
+            </a:extLst>
+          </p:cNvPr>
+          <p:cNvSpPr>
+            <a:spLocks noGrp="1"/>
+          </p:cNvSpPr>
+          <p:nvPr>
+            <p:ph type="title"/>
+          </p:nvPr>
+        </p:nvSpPr>
+        <p:spPr>
+          <a:xfrm>
+            <a:off x="349955" y="425344"/>
+            <a:ext cx="8421512" cy="707886"/>
+          </a:xfrm>
+        </p:spPr>
+        <p:txBody>
+          <a:bodyPr/>
+          <a:lstStyle/>
+          <a:p>
+            <a:r>
+              <a:rPr lang="en-US" sz="4000" dirty="0"/>
+              <a:t>Notes on Measurement Precision</a:t>
+            </a:r>
+          </a:p>
+        </p:txBody>
+      </p:sp>
+      <p:sp>
+        <p:nvSpPr>
+          <p:cNvPr id="3" name="Content Placeholder 2">
+            <a:extLst>
+              <a:ext uri="{FF2B5EF4-FFF2-40B4-BE49-F238E27FC236}">
+                <a16:creationId xmlns:a16="http://schemas.microsoft.com/office/drawing/2014/main" id="{71E21A62-7940-78FB-F4F1-431EAC2236DC}"/>
+              </a:ext>
+            </a:extLst>
+          </p:cNvPr>
+          <p:cNvSpPr>
+            <a:spLocks noGrp="1"/>
+          </p:cNvSpPr>
+          <p:nvPr>
+            <p:ph idx="1"/>
+          </p:nvPr>
+        </p:nvSpPr>
+        <p:spPr>
+          <a:xfrm>
+            <a:off x="372533" y="3780612"/>
+            <a:ext cx="8387645" cy="2766943"/>
+          </a:xfrm>
+        </p:spPr>
+        <p:txBody>
+          <a:bodyPr/>
+          <a:lstStyle/>
+          <a:p>
+            <a:r>
+              <a:rPr lang="en-US" sz="2000" dirty="0"/>
+              <a:t>1(a)</a:t>
+            </a:r>
+            <a:br>
+              <a:rPr lang="en-US" sz="2000" dirty="0"/>
+            </a:br>
+            <a:r>
+              <a:rPr lang="en-US" sz="2000" dirty="0"/>
+              <a:t>Division mark: 0.01 cm</a:t>
+            </a:r>
+            <a:br>
+              <a:rPr lang="en-US" sz="2000" dirty="0"/>
+            </a:br>
+            <a:r>
+              <a:rPr lang="en-US" sz="2000" dirty="0"/>
+              <a:t>Precision = 0.01 cm x 10% = 0.001 cm</a:t>
+            </a:r>
+            <a:br>
+              <a:rPr lang="en-US" sz="2000" dirty="0"/>
+            </a:br>
+            <a:r>
+              <a:rPr lang="en-US" sz="2000" dirty="0"/>
+              <a:t>Measure = </a:t>
+            </a:r>
+            <a:r>
+              <a:rPr lang="en-US" sz="2000" b="1" dirty="0">
+                <a:solidFill>
+                  <a:srgbClr val="00FF00"/>
+                </a:solidFill>
+              </a:rPr>
+              <a:t>2.045 cm</a:t>
+            </a:r>
+            <a:r>
+              <a:rPr lang="en-US" sz="2000" dirty="0">
+                <a:solidFill>
+                  <a:srgbClr val="00FF00"/>
+                </a:solidFill>
+              </a:rPr>
+              <a:t> </a:t>
+            </a:r>
+            <a:r>
+              <a:rPr lang="en-US" sz="2000" dirty="0">
+                <a:sym typeface="Wingdings" panose="05000000000000000000" pitchFamily="2" charset="2"/>
+              </a:rPr>
+              <a:t> precise to 0.001 cm!</a:t>
+            </a:r>
+          </a:p>
+          <a:p>
+            <a:r>
+              <a:rPr lang="en-US" sz="2000" dirty="0"/>
+              <a:t>1(b)</a:t>
+            </a:r>
+          </a:p>
+          <a:p>
+            <a:pPr marL="231775" lvl="1" indent="0">
+              <a:buNone/>
+            </a:pPr>
+            <a:r>
+              <a:rPr lang="en-US" dirty="0"/>
+              <a:t>Division mark:  same as 1(a) </a:t>
+            </a:r>
+            <a:r>
+              <a:rPr lang="en-US" dirty="0">
+                <a:sym typeface="Wingdings" panose="05000000000000000000" pitchFamily="2" charset="2"/>
+              </a:rPr>
+              <a:t> 0.01 cm</a:t>
+            </a:r>
+            <a:br>
+              <a:rPr lang="en-US" dirty="0"/>
+            </a:br>
+            <a:r>
+              <a:rPr lang="en-US" dirty="0"/>
+              <a:t>Precision = same as 1(a) </a:t>
+            </a:r>
+            <a:r>
+              <a:rPr lang="en-US" dirty="0">
+                <a:sym typeface="Wingdings" panose="05000000000000000000" pitchFamily="2" charset="2"/>
+              </a:rPr>
+              <a:t> </a:t>
+            </a:r>
+            <a:r>
+              <a:rPr lang="en-US" dirty="0"/>
+              <a:t>0.01 cm x 10% = 0.001 cm</a:t>
+            </a:r>
+            <a:br>
+              <a:rPr lang="en-US" dirty="0"/>
+            </a:br>
+            <a:r>
+              <a:rPr lang="en-US" dirty="0"/>
+              <a:t>Measure = 2.10 cm but </a:t>
+            </a:r>
+            <a:r>
+              <a:rPr lang="en-US" dirty="0">
+                <a:sym typeface="Wingdings" panose="05000000000000000000" pitchFamily="2" charset="2"/>
+              </a:rPr>
+              <a:t>precise to 0.001 cm  </a:t>
+            </a:r>
+            <a:r>
+              <a:rPr lang="en-US" b="1" dirty="0">
+                <a:solidFill>
+                  <a:srgbClr val="00FF00"/>
+                </a:solidFill>
+                <a:sym typeface="Wingdings" panose="05000000000000000000" pitchFamily="2" charset="2"/>
+              </a:rPr>
+              <a:t>2.100 cm</a:t>
+            </a:r>
+          </a:p>
+          <a:p>
+            <a:pPr marL="231775" lvl="1" indent="0">
+              <a:buNone/>
+            </a:pPr>
+            <a:endParaRPr lang="en-US" dirty="0">
+              <a:solidFill>
+                <a:srgbClr val="00FF00"/>
+              </a:solidFill>
+            </a:endParaRPr>
+          </a:p>
+        </p:txBody>
+      </p:sp>
+      <p:pic>
+        <p:nvPicPr>
+          <p:cNvPr id="5" name="Picture 4">
+            <a:extLst>
+              <a:ext uri="{FF2B5EF4-FFF2-40B4-BE49-F238E27FC236}">
+                <a16:creationId xmlns:a16="http://schemas.microsoft.com/office/drawing/2014/main" id="{5749904A-6C91-7B28-7CCC-9B4AD8070C6A}"/>
+              </a:ext>
+            </a:extLst>
+          </p:cNvPr>
+          <p:cNvPicPr>
+            <a:picLocks noChangeAspect="1"/>
+          </p:cNvPicPr>
+          <p:nvPr/>
+        </p:nvPicPr>
+        <p:blipFill>
+          <a:blip r:embed="rId2"/>
+          <a:stretch>
+            <a:fillRect/>
+          </a:stretch>
+        </p:blipFill>
+        <p:spPr>
+          <a:xfrm>
+            <a:off x="2169371" y="1332090"/>
+            <a:ext cx="4434630" cy="2448522"/>
+          </a:xfrm>
+          <a:prstGeom prst="rect">
+            <a:avLst/>
+          </a:prstGeom>
+        </p:spPr>
+      </p:pic>
+    </p:spTree>
+    <p:extLst>
+      <p:ext uri="{BB962C8B-B14F-4D97-AF65-F5344CB8AC3E}">
+        <p14:creationId xmlns:p14="http://schemas.microsoft.com/office/powerpoint/2010/main" val="2661968598"/>
+      </p:ext>
+    </p:extLst>
+  </p:cSld>
+  <p:clrMapOvr>
+    <a:masterClrMapping/>
+  </p:clrMapOvr>
+</p:sld>
+</file>
+
+<file path=ppt/slides/slide11.xml><?xml version="1.0" encoding="utf-8"?>
+<p:sld xmlns:a="http://schemas.openxmlformats.org/drawingml/2006/main" xmlns:r="http://schemas.openxmlformats.org/officeDocument/2006/relationships" xmlns:p="http://schemas.openxmlformats.org/presentationml/2006/main">
+  <p:cSld>
+    <p:spTree>
+      <p:nvGrpSpPr>
+        <p:cNvPr id="1" name=""/>
+        <p:cNvGrpSpPr/>
+        <p:nvPr/>
+      </p:nvGrpSpPr>
+      <p:grpSpPr>
+        <a:xfrm>
+          <a:off x="0" y="0"/>
+          <a:ext cx="0" cy="0"/>
+          <a:chOff x="0" y="0"/>
+          <a:chExt cx="0" cy="0"/>
+        </a:xfrm>
+      </p:grpSpPr>
+      <p:sp>
+        <p:nvSpPr>
+          <p:cNvPr id="2" name="Title 1">
+            <a:extLst>
+              <a:ext uri="{FF2B5EF4-FFF2-40B4-BE49-F238E27FC236}">
+                <a16:creationId xmlns:a16="http://schemas.microsoft.com/office/drawing/2014/main" id="{9F1B6393-BC38-D56C-483C-1AF763351338}"/>
+              </a:ext>
+            </a:extLst>
+          </p:cNvPr>
+          <p:cNvSpPr>
+            <a:spLocks noGrp="1"/>
+          </p:cNvSpPr>
+          <p:nvPr>
+            <p:ph type="title"/>
+          </p:nvPr>
+        </p:nvSpPr>
+        <p:spPr>
+          <a:xfrm>
+            <a:off x="349955" y="425344"/>
+            <a:ext cx="8421512" cy="707886"/>
+          </a:xfrm>
+        </p:spPr>
+        <p:txBody>
+          <a:bodyPr/>
+          <a:lstStyle/>
+          <a:p>
+            <a:r>
+              <a:rPr lang="en-US" sz="4000" dirty="0"/>
+              <a:t>Notes on Measurement Precision</a:t>
+            </a:r>
+          </a:p>
+        </p:txBody>
+      </p:sp>
+      <p:sp>
+        <p:nvSpPr>
+          <p:cNvPr id="3" name="Content Placeholder 2">
+            <a:extLst>
+              <a:ext uri="{FF2B5EF4-FFF2-40B4-BE49-F238E27FC236}">
+                <a16:creationId xmlns:a16="http://schemas.microsoft.com/office/drawing/2014/main" id="{00FC15BE-7920-ECEE-1CCA-F8D2B2ED620A}"/>
+              </a:ext>
+            </a:extLst>
+          </p:cNvPr>
+          <p:cNvSpPr>
+            <a:spLocks noGrp="1"/>
+          </p:cNvSpPr>
+          <p:nvPr>
+            <p:ph idx="1"/>
+          </p:nvPr>
+        </p:nvSpPr>
+        <p:spPr>
+          <a:xfrm>
+            <a:off x="372533" y="4667460"/>
+            <a:ext cx="8387645" cy="1880095"/>
+          </a:xfrm>
+        </p:spPr>
+        <p:txBody>
+          <a:bodyPr/>
+          <a:lstStyle/>
+          <a:p>
+            <a:r>
+              <a:rPr lang="en-US" dirty="0"/>
+              <a:t>Slide 2 (a) and (b)</a:t>
+            </a:r>
+          </a:p>
+        </p:txBody>
+      </p:sp>
+      <p:pic>
+        <p:nvPicPr>
+          <p:cNvPr id="7" name="Picture 6">
+            <a:extLst>
+              <a:ext uri="{FF2B5EF4-FFF2-40B4-BE49-F238E27FC236}">
+                <a16:creationId xmlns:a16="http://schemas.microsoft.com/office/drawing/2014/main" id="{98486516-FCAF-1DA9-4EE1-E277F41C80BA}"/>
+              </a:ext>
+            </a:extLst>
+          </p:cNvPr>
+          <p:cNvPicPr>
+            <a:picLocks noChangeAspect="1"/>
+          </p:cNvPicPr>
+          <p:nvPr/>
+        </p:nvPicPr>
+        <p:blipFill>
+          <a:blip r:embed="rId2"/>
+          <a:stretch>
+            <a:fillRect/>
+          </a:stretch>
+        </p:blipFill>
+        <p:spPr>
+          <a:xfrm>
+            <a:off x="1666469" y="1485666"/>
+            <a:ext cx="5811061" cy="3181794"/>
+          </a:xfrm>
+          <a:prstGeom prst="rect">
+            <a:avLst/>
+          </a:prstGeom>
+        </p:spPr>
+      </p:pic>
+    </p:spTree>
+    <p:extLst>
+      <p:ext uri="{BB962C8B-B14F-4D97-AF65-F5344CB8AC3E}">
+        <p14:creationId xmlns:p14="http://schemas.microsoft.com/office/powerpoint/2010/main" val="1042931916"/>
+      </p:ext>
+    </p:extLst>
+  </p:cSld>
+  <p:clrMapOvr>
+    <a:masterClrMapping/>
+  </p:clrMapOvr>
+</p:sld>
+</file>
+
+<file path=ppt/slides/slide12.xml><?xml version="1.0" encoding="utf-8"?>
+<p:sld xmlns:a="http://schemas.openxmlformats.org/drawingml/2006/main" xmlns:r="http://schemas.openxmlformats.org/officeDocument/2006/relationships" xmlns:p="http://schemas.openxmlformats.org/presentationml/2006/main">
+  <p:cSld>
+    <p:spTree>
+      <p:nvGrpSpPr>
+        <p:cNvPr id="1" name="">
+          <a:extLst>
+            <a:ext uri="{FF2B5EF4-FFF2-40B4-BE49-F238E27FC236}">
+              <a16:creationId xmlns:a16="http://schemas.microsoft.com/office/drawing/2014/main" id="{483A90C0-F3A7-9225-9947-61B44581B54D}"/>
+            </a:ext>
+          </a:extLst>
+        </p:cNvPr>
+        <p:cNvGrpSpPr/>
+        <p:nvPr/>
+      </p:nvGrpSpPr>
+      <p:grpSpPr>
+        <a:xfrm>
+          <a:off x="0" y="0"/>
+          <a:ext cx="0" cy="0"/>
+          <a:chOff x="0" y="0"/>
+          <a:chExt cx="0" cy="0"/>
+        </a:xfrm>
+      </p:grpSpPr>
+      <p:sp>
+        <p:nvSpPr>
+          <p:cNvPr id="2" name="Title 1">
+            <a:extLst>
+              <a:ext uri="{FF2B5EF4-FFF2-40B4-BE49-F238E27FC236}">
+                <a16:creationId xmlns:a16="http://schemas.microsoft.com/office/drawing/2014/main" id="{567F5034-194E-5149-AC2E-C8B56BC7B3D9}"/>
+              </a:ext>
+            </a:extLst>
+          </p:cNvPr>
+          <p:cNvSpPr>
+            <a:spLocks noGrp="1"/>
+          </p:cNvSpPr>
+          <p:nvPr>
+            <p:ph type="title"/>
+          </p:nvPr>
+        </p:nvSpPr>
+        <p:spPr>
+          <a:xfrm>
+            <a:off x="349955" y="425344"/>
+            <a:ext cx="8421512" cy="707886"/>
+          </a:xfrm>
+        </p:spPr>
+        <p:txBody>
+          <a:bodyPr/>
+          <a:lstStyle/>
+          <a:p>
+            <a:r>
+              <a:rPr lang="en-US" sz="4000" dirty="0"/>
+              <a:t>Notes on Measurement Precision</a:t>
+            </a:r>
+          </a:p>
+        </p:txBody>
+      </p:sp>
+      <p:sp>
+        <p:nvSpPr>
+          <p:cNvPr id="3" name="Content Placeholder 2">
+            <a:extLst>
+              <a:ext uri="{FF2B5EF4-FFF2-40B4-BE49-F238E27FC236}">
+                <a16:creationId xmlns:a16="http://schemas.microsoft.com/office/drawing/2014/main" id="{E93C9D11-FE62-75B8-2C68-3AB75AE7002A}"/>
+              </a:ext>
+            </a:extLst>
+          </p:cNvPr>
+          <p:cNvSpPr>
+            <a:spLocks noGrp="1"/>
+          </p:cNvSpPr>
+          <p:nvPr>
+            <p:ph idx="1"/>
+          </p:nvPr>
+        </p:nvSpPr>
+        <p:spPr>
+          <a:xfrm>
+            <a:off x="372533" y="4228094"/>
+            <a:ext cx="8387645" cy="2319461"/>
+          </a:xfrm>
+        </p:spPr>
+        <p:txBody>
+          <a:bodyPr/>
+          <a:lstStyle/>
+          <a:p>
+            <a:r>
+              <a:rPr lang="en-US" dirty="0"/>
+              <a:t>Slide 3 (a) and (b)</a:t>
+            </a:r>
+          </a:p>
+          <a:p>
+            <a:endParaRPr lang="en-US" dirty="0"/>
+          </a:p>
+        </p:txBody>
+      </p:sp>
+      <p:pic>
+        <p:nvPicPr>
+          <p:cNvPr id="6" name="Picture 5">
+            <a:extLst>
+              <a:ext uri="{FF2B5EF4-FFF2-40B4-BE49-F238E27FC236}">
+                <a16:creationId xmlns:a16="http://schemas.microsoft.com/office/drawing/2014/main" id="{08D60B9D-D24F-BFF7-D4B4-EB120F6D3B4F}"/>
+              </a:ext>
+            </a:extLst>
+          </p:cNvPr>
+          <p:cNvPicPr>
+            <a:picLocks noChangeAspect="1"/>
+          </p:cNvPicPr>
+          <p:nvPr/>
+        </p:nvPicPr>
+        <p:blipFill>
+          <a:blip r:embed="rId2"/>
+          <a:stretch>
+            <a:fillRect/>
+          </a:stretch>
+        </p:blipFill>
+        <p:spPr>
+          <a:xfrm>
+            <a:off x="1607248" y="1332090"/>
+            <a:ext cx="5696745" cy="2896004"/>
+          </a:xfrm>
+          <a:prstGeom prst="rect">
+            <a:avLst/>
+          </a:prstGeom>
+        </p:spPr>
+      </p:pic>
+    </p:spTree>
+    <p:extLst>
+      <p:ext uri="{BB962C8B-B14F-4D97-AF65-F5344CB8AC3E}">
+        <p14:creationId xmlns:p14="http://schemas.microsoft.com/office/powerpoint/2010/main" val="3779188351"/>
+      </p:ext>
+    </p:extLst>
+  </p:cSld>
+  <p:clrMapOvr>
+    <a:masterClrMapping/>
+  </p:clrMapOvr>
+</p:sld>
+</file>
+
+<file path=ppt/slides/slide13.xml><?xml version="1.0" encoding="utf-8"?>
+<p:sld xmlns:a="http://schemas.openxmlformats.org/drawingml/2006/main" xmlns:r="http://schemas.openxmlformats.org/officeDocument/2006/relationships" xmlns:p="http://schemas.openxmlformats.org/presentationml/2006/main">
+  <p:cSld>
+    <p:spTree>
+      <p:nvGrpSpPr>
+        <p:cNvPr id="1" name="">
+          <a:extLst>
+            <a:ext uri="{FF2B5EF4-FFF2-40B4-BE49-F238E27FC236}">
+              <a16:creationId xmlns:a16="http://schemas.microsoft.com/office/drawing/2014/main" id="{3A52ACA3-5679-8783-376A-E97A311CD6AF}"/>
+            </a:ext>
+          </a:extLst>
+        </p:cNvPr>
+        <p:cNvGrpSpPr/>
+        <p:nvPr/>
+      </p:nvGrpSpPr>
+      <p:grpSpPr>
+        <a:xfrm>
+          <a:off x="0" y="0"/>
+          <a:ext cx="0" cy="0"/>
+          <a:chOff x="0" y="0"/>
+          <a:chExt cx="0" cy="0"/>
+        </a:xfrm>
+      </p:grpSpPr>
+      <p:sp>
+        <p:nvSpPr>
+          <p:cNvPr id="2" name="Title 1">
+            <a:extLst>
+              <a:ext uri="{FF2B5EF4-FFF2-40B4-BE49-F238E27FC236}">
+                <a16:creationId xmlns:a16="http://schemas.microsoft.com/office/drawing/2014/main" id="{249D6CFB-DDD0-CD3C-4D60-9F4FF03B972F}"/>
+              </a:ext>
+            </a:extLst>
+          </p:cNvPr>
+          <p:cNvSpPr>
+            <a:spLocks noGrp="1"/>
+          </p:cNvSpPr>
+          <p:nvPr>
+            <p:ph type="title"/>
+          </p:nvPr>
+        </p:nvSpPr>
+        <p:spPr>
+          <a:xfrm>
+            <a:off x="349955" y="425344"/>
+            <a:ext cx="8421512" cy="707886"/>
+          </a:xfrm>
+        </p:spPr>
+        <p:txBody>
+          <a:bodyPr/>
+          <a:lstStyle/>
+          <a:p>
+            <a:r>
+              <a:rPr lang="en-US" sz="4000" dirty="0"/>
+              <a:t>Notes on Measurement Precision</a:t>
+            </a:r>
+          </a:p>
+        </p:txBody>
+      </p:sp>
+      <p:sp>
+        <p:nvSpPr>
+          <p:cNvPr id="3" name="Content Placeholder 2">
+            <a:extLst>
+              <a:ext uri="{FF2B5EF4-FFF2-40B4-BE49-F238E27FC236}">
+                <a16:creationId xmlns:a16="http://schemas.microsoft.com/office/drawing/2014/main" id="{873EBF62-9AF8-A11C-5EF3-BF7A8C295741}"/>
+              </a:ext>
+            </a:extLst>
+          </p:cNvPr>
+          <p:cNvSpPr>
+            <a:spLocks noGrp="1"/>
+          </p:cNvSpPr>
+          <p:nvPr>
+            <p:ph idx="1"/>
+          </p:nvPr>
+        </p:nvSpPr>
+        <p:spPr>
+          <a:xfrm>
+            <a:off x="372533" y="4227690"/>
+            <a:ext cx="8387645" cy="2319865"/>
+          </a:xfrm>
+        </p:spPr>
+        <p:txBody>
+          <a:bodyPr/>
+          <a:lstStyle/>
+          <a:p>
+            <a:r>
+              <a:rPr lang="en-US" dirty="0"/>
+              <a:t>Slide 4 (a) and (b)</a:t>
+            </a:r>
+          </a:p>
+          <a:p>
+            <a:endParaRPr lang="en-US" dirty="0"/>
+          </a:p>
+        </p:txBody>
+      </p:sp>
+      <p:pic>
+        <p:nvPicPr>
+          <p:cNvPr id="8" name="Picture 7">
+            <a:extLst>
+              <a:ext uri="{FF2B5EF4-FFF2-40B4-BE49-F238E27FC236}">
+                <a16:creationId xmlns:a16="http://schemas.microsoft.com/office/drawing/2014/main" id="{2897DB59-29FC-4DEE-3DD8-D7D4FD738DEB}"/>
+              </a:ext>
+            </a:extLst>
+          </p:cNvPr>
+          <p:cNvPicPr>
+            <a:picLocks noChangeAspect="1"/>
+          </p:cNvPicPr>
+          <p:nvPr/>
+        </p:nvPicPr>
+        <p:blipFill>
+          <a:blip r:embed="rId2"/>
+          <a:stretch>
+            <a:fillRect/>
+          </a:stretch>
+        </p:blipFill>
+        <p:spPr>
+          <a:xfrm>
+            <a:off x="1640898" y="1332090"/>
+            <a:ext cx="5695950" cy="2895600"/>
+          </a:xfrm>
+          <a:prstGeom prst="rect">
+            <a:avLst/>
+          </a:prstGeom>
+        </p:spPr>
+      </p:pic>
+    </p:spTree>
+    <p:extLst>
+      <p:ext uri="{BB962C8B-B14F-4D97-AF65-F5344CB8AC3E}">
+        <p14:creationId xmlns:p14="http://schemas.microsoft.com/office/powerpoint/2010/main" val="3911563821"/>
+      </p:ext>
+    </p:extLst>
+  </p:cSld>
+  <p:clrMapOvr>
+    <a:masterClrMapping/>
+  </p:clrMapOvr>
+</p:sld>
+</file>
+
+<file path=ppt/slides/slide14.xml><?xml version="1.0" encoding="utf-8"?>
+<p:sld xmlns:a="http://schemas.openxmlformats.org/drawingml/2006/main" xmlns:r="http://schemas.openxmlformats.org/officeDocument/2006/relationships" xmlns:p="http://schemas.openxmlformats.org/presentationml/2006/main">
+  <p:cSld>
+    <p:spTree>
+      <p:nvGrpSpPr>
+        <p:cNvPr id="1" name="">
+          <a:extLst>
+            <a:ext uri="{FF2B5EF4-FFF2-40B4-BE49-F238E27FC236}">
+              <a16:creationId xmlns:a16="http://schemas.microsoft.com/office/drawing/2014/main" id="{ED3A1B71-3191-9623-5E41-40F3CDC6A3FD}"/>
+            </a:ext>
+          </a:extLst>
+        </p:cNvPr>
+        <p:cNvGrpSpPr/>
+        <p:nvPr/>
+      </p:nvGrpSpPr>
+      <p:grpSpPr>
+        <a:xfrm>
+          <a:off x="0" y="0"/>
+          <a:ext cx="0" cy="0"/>
+          <a:chOff x="0" y="0"/>
+          <a:chExt cx="0" cy="0"/>
+        </a:xfrm>
+      </p:grpSpPr>
+      <p:sp>
+        <p:nvSpPr>
+          <p:cNvPr id="2" name="Title 1">
+            <a:extLst>
+              <a:ext uri="{FF2B5EF4-FFF2-40B4-BE49-F238E27FC236}">
+                <a16:creationId xmlns:a16="http://schemas.microsoft.com/office/drawing/2014/main" id="{0B421E9E-E289-BE02-90A8-23012EDA33E6}"/>
+              </a:ext>
+            </a:extLst>
+          </p:cNvPr>
+          <p:cNvSpPr>
+            <a:spLocks noGrp="1"/>
+          </p:cNvSpPr>
+          <p:nvPr>
+            <p:ph type="title"/>
+          </p:nvPr>
+        </p:nvSpPr>
+        <p:spPr>
+          <a:xfrm>
+            <a:off x="349955" y="425344"/>
+            <a:ext cx="8421512" cy="707886"/>
+          </a:xfrm>
+        </p:spPr>
+        <p:txBody>
+          <a:bodyPr/>
+          <a:lstStyle/>
+          <a:p>
+            <a:r>
+              <a:rPr lang="en-US" sz="4000" dirty="0"/>
+              <a:t>Notes on Measurement Precision</a:t>
+            </a:r>
+          </a:p>
+        </p:txBody>
+      </p:sp>
+      <p:sp>
+        <p:nvSpPr>
+          <p:cNvPr id="3" name="Content Placeholder 2">
+            <a:extLst>
+              <a:ext uri="{FF2B5EF4-FFF2-40B4-BE49-F238E27FC236}">
+                <a16:creationId xmlns:a16="http://schemas.microsoft.com/office/drawing/2014/main" id="{D71DF447-6352-207D-7C68-18EA7A65E92E}"/>
+              </a:ext>
+            </a:extLst>
+          </p:cNvPr>
+          <p:cNvSpPr>
+            <a:spLocks noGrp="1"/>
+          </p:cNvSpPr>
+          <p:nvPr>
+            <p:ph idx="1"/>
+          </p:nvPr>
+        </p:nvSpPr>
+        <p:spPr>
+          <a:xfrm>
+            <a:off x="372533" y="1354976"/>
+            <a:ext cx="8387645" cy="5192580"/>
+          </a:xfrm>
+        </p:spPr>
+        <p:txBody>
+          <a:bodyPr/>
+          <a:lstStyle/>
+          <a:p>
+            <a:pPr marL="0" indent="0">
+              <a:buNone/>
+            </a:pPr>
+            <a:r>
+              <a:rPr lang="en-US" b="1" i="1" dirty="0">
+                <a:solidFill>
+                  <a:srgbClr val="CC99FF"/>
+                </a:solidFill>
+              </a:rPr>
+              <a:t>Key</a:t>
+            </a:r>
+          </a:p>
+          <a:p>
+            <a:pPr marL="0" indent="0">
+              <a:buNone/>
+            </a:pPr>
+            <a:endParaRPr lang="en-US" dirty="0"/>
+          </a:p>
+        </p:txBody>
+      </p:sp>
+      <p:graphicFrame>
+        <p:nvGraphicFramePr>
+          <p:cNvPr id="4" name="Table 3">
+            <a:extLst>
+              <a:ext uri="{FF2B5EF4-FFF2-40B4-BE49-F238E27FC236}">
+                <a16:creationId xmlns:a16="http://schemas.microsoft.com/office/drawing/2014/main" id="{33355A81-B278-B85A-25A8-5B2BFAC4581B}"/>
+              </a:ext>
+            </a:extLst>
+          </p:cNvPr>
+          <p:cNvGraphicFramePr>
+            <a:graphicFrameLocks noGrp="1"/>
+          </p:cNvGraphicFramePr>
+          <p:nvPr>
+            <p:extLst>
+              <p:ext uri="{D42A27DB-BD31-4B8C-83A1-F6EECF244321}">
+                <p14:modId xmlns:p14="http://schemas.microsoft.com/office/powerpoint/2010/main" val="2231646236"/>
+              </p:ext>
+            </p:extLst>
+          </p:nvPr>
+        </p:nvGraphicFramePr>
+        <p:xfrm>
+          <a:off x="550076" y="1983425"/>
+          <a:ext cx="7815549" cy="2865120"/>
+        </p:xfrm>
+        <a:graphic>
+          <a:graphicData uri="http://schemas.openxmlformats.org/drawingml/2006/table">
+            <a:tbl>
+              <a:tblPr firstRow="1" bandRow="1">
+                <a:tableStyleId>{073A0DAA-6AF3-43AB-8588-CEC1D06C72B9}</a:tableStyleId>
+              </a:tblPr>
+              <a:tblGrid>
+                <a:gridCol w="650284">
+                  <a:extLst>
+                    <a:ext uri="{9D8B030D-6E8A-4147-A177-3AD203B41FA5}">
+                      <a16:colId xmlns:a16="http://schemas.microsoft.com/office/drawing/2014/main" val="1575648802"/>
+                    </a:ext>
+                  </a:extLst>
+                </a:gridCol>
+                <a:gridCol w="1285901">
+                  <a:extLst>
+                    <a:ext uri="{9D8B030D-6E8A-4147-A177-3AD203B41FA5}">
+                      <a16:colId xmlns:a16="http://schemas.microsoft.com/office/drawing/2014/main" val="1775112658"/>
+                    </a:ext>
+                  </a:extLst>
+                </a:gridCol>
+                <a:gridCol w="1284694">
+                  <a:extLst>
+                    <a:ext uri="{9D8B030D-6E8A-4147-A177-3AD203B41FA5}">
+                      <a16:colId xmlns:a16="http://schemas.microsoft.com/office/drawing/2014/main" val="4114746042"/>
+                    </a:ext>
+                  </a:extLst>
+                </a:gridCol>
+                <a:gridCol w="1352708">
+                  <a:extLst>
+                    <a:ext uri="{9D8B030D-6E8A-4147-A177-3AD203B41FA5}">
+                      <a16:colId xmlns:a16="http://schemas.microsoft.com/office/drawing/2014/main" val="4263845097"/>
+                    </a:ext>
+                  </a:extLst>
+                </a:gridCol>
+                <a:gridCol w="3241962">
+                  <a:extLst>
+                    <a:ext uri="{9D8B030D-6E8A-4147-A177-3AD203B41FA5}">
+                      <a16:colId xmlns:a16="http://schemas.microsoft.com/office/drawing/2014/main" val="1456518144"/>
+                    </a:ext>
+                  </a:extLst>
+                </a:gridCol>
+              </a:tblGrid>
+              <a:tr h="370840">
+                <a:tc>
+                  <a:txBody>
+                    <a:bodyPr/>
+                    <a:lstStyle/>
+                    <a:p>
+                      <a:endParaRPr lang="en-US" dirty="0"/>
+                    </a:p>
+                  </a:txBody>
+                  <a:tcPr/>
+                </a:tc>
+                <a:tc>
+                  <a:txBody>
+                    <a:bodyPr/>
+                    <a:lstStyle/>
+                    <a:p>
+                      <a:r>
+                        <a:rPr lang="en-US" b="0" dirty="0"/>
+                        <a:t>Division mark</a:t>
+                      </a:r>
+                    </a:p>
+                  </a:txBody>
+                  <a:tcPr anchor="b"/>
+                </a:tc>
+                <a:tc>
+                  <a:txBody>
+                    <a:bodyPr/>
+                    <a:lstStyle/>
+                    <a:p>
+                      <a:r>
+                        <a:rPr lang="en-US" b="0" dirty="0"/>
+                        <a:t>Precision</a:t>
+                      </a:r>
+                    </a:p>
+                  </a:txBody>
+                  <a:tcPr anchor="b"/>
+                </a:tc>
+                <a:tc>
+                  <a:txBody>
+                    <a:bodyPr/>
+                    <a:lstStyle/>
+                    <a:p>
+                      <a:r>
+                        <a:rPr lang="en-US" b="0" dirty="0"/>
+                        <a:t>Measure</a:t>
+                      </a:r>
+                    </a:p>
+                  </a:txBody>
+                  <a:tcPr anchor="b"/>
+                </a:tc>
+                <a:tc>
+                  <a:txBody>
+                    <a:bodyPr/>
+                    <a:lstStyle/>
+                    <a:p>
+                      <a:endParaRPr lang="en-US" b="0" dirty="0"/>
+                    </a:p>
+                  </a:txBody>
+                  <a:tcPr/>
+                </a:tc>
+                <a:extLst>
+                  <a:ext uri="{0D108BD9-81ED-4DB2-BD59-A6C34878D82A}">
+                    <a16:rowId xmlns:a16="http://schemas.microsoft.com/office/drawing/2014/main" val="4192710162"/>
+                  </a:ext>
+                </a:extLst>
+              </a:tr>
+              <a:tr h="370840">
+                <a:tc>
+                  <a:txBody>
+                    <a:bodyPr/>
+                    <a:lstStyle/>
+                    <a:p>
+                      <a:r>
+                        <a:rPr lang="en-US" dirty="0"/>
+                        <a:t>2a</a:t>
+                      </a:r>
+                    </a:p>
+                  </a:txBody>
+                  <a:tcPr/>
+                </a:tc>
+                <a:tc>
+                  <a:txBody>
+                    <a:bodyPr/>
+                    <a:lstStyle/>
+                    <a:p>
+                      <a:r>
+                        <a:rPr lang="en-US" dirty="0"/>
+                        <a:t>1°C</a:t>
+                      </a:r>
+                    </a:p>
+                  </a:txBody>
+                  <a:tcPr/>
+                </a:tc>
+                <a:tc>
+                  <a:txBody>
+                    <a:bodyPr/>
+                    <a:lstStyle/>
+                    <a:p>
+                      <a:r>
+                        <a:rPr lang="en-US" dirty="0"/>
+                        <a:t>0.1°C</a:t>
+                      </a:r>
+                    </a:p>
+                  </a:txBody>
+                  <a:tcPr/>
+                </a:tc>
+                <a:tc>
+                  <a:txBody>
+                    <a:bodyPr/>
+                    <a:lstStyle/>
+                    <a:p>
+                      <a:r>
+                        <a:rPr lang="en-US" dirty="0"/>
+                        <a:t>22.5°C</a:t>
+                      </a:r>
+                    </a:p>
+                  </a:txBody>
+                  <a:tcPr/>
+                </a:tc>
+                <a:tc>
+                  <a:txBody>
+                    <a:bodyPr/>
+                    <a:lstStyle/>
+                    <a:p>
+                      <a:r>
+                        <a:rPr lang="en-US" sz="1400" dirty="0"/>
+                        <a:t>Precision = division mark x 10%</a:t>
+                      </a:r>
+                    </a:p>
+                  </a:txBody>
+                  <a:tcPr/>
+                </a:tc>
+                <a:extLst>
+                  <a:ext uri="{0D108BD9-81ED-4DB2-BD59-A6C34878D82A}">
+                    <a16:rowId xmlns:a16="http://schemas.microsoft.com/office/drawing/2014/main" val="1722778529"/>
+                  </a:ext>
+                </a:extLst>
+              </a:tr>
+              <a:tr h="370840">
+                <a:tc>
+                  <a:txBody>
+                    <a:bodyPr/>
+                    <a:lstStyle/>
+                    <a:p>
+                      <a:r>
+                        <a:rPr lang="en-US" dirty="0"/>
+                        <a:t>2b</a:t>
+                      </a:r>
+                    </a:p>
+                  </a:txBody>
+                  <a:tcPr/>
+                </a:tc>
+                <a:tc>
+                  <a:txBody>
+                    <a:bodyPr/>
+                    <a:lstStyle/>
+                    <a:p>
+                      <a:pPr marL="0" marR="0" lvl="0" indent="0" algn="l" defTabSz="914400" rtl="0" eaLnBrk="1" fontAlgn="auto" latinLnBrk="0" hangingPunct="1">
+                        <a:lnSpc>
+                          <a:spcPct val="100000"/>
+                        </a:lnSpc>
+                        <a:spcBef>
+                          <a:spcPts val="0"/>
+                        </a:spcBef>
+                        <a:spcAft>
+                          <a:spcPts val="0"/>
+                        </a:spcAft>
+                        <a:buClrTx/>
+                        <a:buSzTx/>
+                        <a:buFontTx/>
+                        <a:buNone/>
+                        <a:tabLst/>
+                        <a:defRPr/>
+                      </a:pPr>
+                      <a:r>
+                        <a:rPr lang="en-US" dirty="0"/>
+                        <a:t>1°C</a:t>
+                      </a:r>
+                    </a:p>
+                  </a:txBody>
+                  <a:tcPr/>
+                </a:tc>
+                <a:tc>
+                  <a:txBody>
+                    <a:bodyPr/>
+                    <a:lstStyle/>
+                    <a:p>
+                      <a:pPr marL="0" marR="0" lvl="0" indent="0" algn="l" defTabSz="914400" rtl="0" eaLnBrk="1" fontAlgn="auto" latinLnBrk="0" hangingPunct="1">
+                        <a:lnSpc>
+                          <a:spcPct val="100000"/>
+                        </a:lnSpc>
+                        <a:spcBef>
+                          <a:spcPts val="0"/>
+                        </a:spcBef>
+                        <a:spcAft>
+                          <a:spcPts val="0"/>
+                        </a:spcAft>
+                        <a:buClrTx/>
+                        <a:buSzTx/>
+                        <a:buFontTx/>
+                        <a:buNone/>
+                        <a:tabLst/>
+                        <a:defRPr/>
+                      </a:pPr>
+                      <a:r>
+                        <a:rPr lang="en-US" dirty="0"/>
+                        <a:t>0.1°C</a:t>
+                      </a:r>
+                    </a:p>
+                  </a:txBody>
+                  <a:tcPr/>
+                </a:tc>
+                <a:tc>
+                  <a:txBody>
+                    <a:bodyPr/>
+                    <a:lstStyle/>
+                    <a:p>
+                      <a:r>
+                        <a:rPr lang="en-US" dirty="0"/>
+                        <a:t>22.0°</a:t>
+                      </a:r>
+                    </a:p>
+                  </a:txBody>
+                  <a:tcPr/>
+                </a:tc>
+                <a:tc>
+                  <a:txBody>
+                    <a:bodyPr/>
+                    <a:lstStyle/>
+                    <a:p>
+                      <a:r>
+                        <a:rPr lang="en-US" dirty="0"/>
+                        <a:t>Not “22°C”</a:t>
+                      </a:r>
+                    </a:p>
+                  </a:txBody>
+                  <a:tcPr/>
+                </a:tc>
+                <a:extLst>
+                  <a:ext uri="{0D108BD9-81ED-4DB2-BD59-A6C34878D82A}">
+                    <a16:rowId xmlns:a16="http://schemas.microsoft.com/office/drawing/2014/main" val="2185406057"/>
+                  </a:ext>
+                </a:extLst>
+              </a:tr>
+              <a:tr h="370840">
+                <a:tc>
+                  <a:txBody>
+                    <a:bodyPr/>
+                    <a:lstStyle/>
+                    <a:p>
+                      <a:r>
+                        <a:rPr lang="en-US" dirty="0"/>
+                        <a:t>3a</a:t>
+                      </a:r>
+                    </a:p>
+                  </a:txBody>
+                  <a:tcPr/>
+                </a:tc>
+                <a:tc>
+                  <a:txBody>
+                    <a:bodyPr/>
+                    <a:lstStyle/>
+                    <a:p>
+                      <a:r>
+                        <a:rPr lang="en-US" dirty="0"/>
+                        <a:t>10 mL</a:t>
+                      </a:r>
+                    </a:p>
+                  </a:txBody>
+                  <a:tcPr/>
+                </a:tc>
+                <a:tc>
+                  <a:txBody>
+                    <a:bodyPr/>
+                    <a:lstStyle/>
+                    <a:p>
+                      <a:r>
+                        <a:rPr lang="en-US" dirty="0"/>
+                        <a:t>1 mL</a:t>
+                      </a:r>
+                    </a:p>
+                  </a:txBody>
+                  <a:tcPr/>
+                </a:tc>
+                <a:tc>
+                  <a:txBody>
+                    <a:bodyPr/>
+                    <a:lstStyle/>
+                    <a:p>
+                      <a:r>
+                        <a:rPr lang="en-US" dirty="0"/>
+                        <a:t>172 mL</a:t>
+                      </a:r>
+                    </a:p>
+                  </a:txBody>
+                  <a:tcPr/>
+                </a:tc>
+                <a:tc>
+                  <a:txBody>
+                    <a:bodyPr/>
+                    <a:lstStyle/>
+                    <a:p>
+                      <a:r>
+                        <a:rPr lang="en-US" sz="1600" dirty="0"/>
+                        <a:t>Not “170 mL” or “172.0 mL”</a:t>
+                      </a:r>
+                    </a:p>
+                  </a:txBody>
+                  <a:tcPr/>
+                </a:tc>
+                <a:extLst>
+                  <a:ext uri="{0D108BD9-81ED-4DB2-BD59-A6C34878D82A}">
+                    <a16:rowId xmlns:a16="http://schemas.microsoft.com/office/drawing/2014/main" val="2608791147"/>
+                  </a:ext>
+                </a:extLst>
+              </a:tr>
+              <a:tr h="370840">
+                <a:tc>
+                  <a:txBody>
+                    <a:bodyPr/>
+                    <a:lstStyle/>
+                    <a:p>
+                      <a:r>
+                        <a:rPr lang="en-US" dirty="0"/>
+                        <a:t>3b</a:t>
+                      </a:r>
+                    </a:p>
+                  </a:txBody>
+                  <a:tcPr/>
+                </a:tc>
+                <a:tc>
+                  <a:txBody>
+                    <a:bodyPr/>
+                    <a:lstStyle/>
+                    <a:p>
+                      <a:r>
+                        <a:rPr lang="en-US" dirty="0"/>
+                        <a:t>10 mL</a:t>
+                      </a:r>
+                    </a:p>
+                  </a:txBody>
+                  <a:tcPr/>
+                </a:tc>
+                <a:tc>
+                  <a:txBody>
+                    <a:bodyPr/>
+                    <a:lstStyle/>
+                    <a:p>
+                      <a:r>
+                        <a:rPr lang="en-US" dirty="0"/>
+                        <a:t>1 mL</a:t>
+                      </a:r>
+                    </a:p>
+                  </a:txBody>
+                  <a:tcPr/>
+                </a:tc>
+                <a:tc>
+                  <a:txBody>
+                    <a:bodyPr/>
+                    <a:lstStyle/>
+                    <a:p>
+                      <a:r>
+                        <a:rPr lang="en-US" dirty="0"/>
+                        <a:t>178 mL</a:t>
+                      </a:r>
+                    </a:p>
+                  </a:txBody>
+                  <a:tcPr/>
+                </a:tc>
+                <a:tc>
+                  <a:txBody>
+                    <a:bodyPr/>
+                    <a:lstStyle/>
+                    <a:p>
+                      <a:endParaRPr lang="en-US" sz="1600" dirty="0"/>
+                    </a:p>
+                  </a:txBody>
+                  <a:tcPr/>
+                </a:tc>
+                <a:extLst>
+                  <a:ext uri="{0D108BD9-81ED-4DB2-BD59-A6C34878D82A}">
+                    <a16:rowId xmlns:a16="http://schemas.microsoft.com/office/drawing/2014/main" val="3882686482"/>
+                  </a:ext>
+                </a:extLst>
+              </a:tr>
+              <a:tr h="370840">
+                <a:tc>
+                  <a:txBody>
+                    <a:bodyPr/>
+                    <a:lstStyle/>
+                    <a:p>
+                      <a:r>
+                        <a:rPr lang="en-US" dirty="0"/>
+                        <a:t>4a</a:t>
+                      </a:r>
+                    </a:p>
+                  </a:txBody>
+                  <a:tcPr/>
+                </a:tc>
+                <a:tc>
+                  <a:txBody>
+                    <a:bodyPr/>
+                    <a:lstStyle/>
+                    <a:p>
+                      <a:r>
+                        <a:rPr lang="en-US" dirty="0"/>
+                        <a:t>1 mL</a:t>
+                      </a:r>
+                    </a:p>
+                  </a:txBody>
+                  <a:tcPr/>
+                </a:tc>
+                <a:tc>
+                  <a:txBody>
+                    <a:bodyPr/>
+                    <a:lstStyle/>
+                    <a:p>
+                      <a:r>
+                        <a:rPr lang="en-US" dirty="0"/>
+                        <a:t>0.1 mL</a:t>
+                      </a:r>
+                    </a:p>
+                  </a:txBody>
+                  <a:tcPr/>
+                </a:tc>
+                <a:tc>
+                  <a:txBody>
+                    <a:bodyPr/>
+                    <a:lstStyle/>
+                    <a:p>
+                      <a:r>
+                        <a:rPr lang="en-US" dirty="0"/>
+                        <a:t>27.2 mL</a:t>
+                      </a:r>
+                    </a:p>
+                  </a:txBody>
+                  <a:tcPr/>
+                </a:tc>
+                <a:tc>
+                  <a:txBody>
+                    <a:bodyPr/>
+                    <a:lstStyle/>
+                    <a:p>
+                      <a:endParaRPr lang="en-US" sz="1600" dirty="0"/>
+                    </a:p>
+                  </a:txBody>
+                  <a:tcPr/>
+                </a:tc>
+                <a:extLst>
+                  <a:ext uri="{0D108BD9-81ED-4DB2-BD59-A6C34878D82A}">
+                    <a16:rowId xmlns:a16="http://schemas.microsoft.com/office/drawing/2014/main" val="3342760875"/>
+                  </a:ext>
+                </a:extLst>
+              </a:tr>
+              <a:tr h="370840">
+                <a:tc>
+                  <a:txBody>
+                    <a:bodyPr/>
+                    <a:lstStyle/>
+                    <a:p>
+                      <a:r>
+                        <a:rPr lang="en-US" dirty="0"/>
+                        <a:t>4b</a:t>
+                      </a:r>
+                    </a:p>
+                  </a:txBody>
+                  <a:tcPr/>
+                </a:tc>
+                <a:tc>
+                  <a:txBody>
+                    <a:bodyPr/>
+                    <a:lstStyle/>
+                    <a:p>
+                      <a:r>
+                        <a:rPr lang="en-US" dirty="0"/>
+                        <a:t>0.05 cm</a:t>
+                      </a:r>
+                    </a:p>
+                  </a:txBody>
+                  <a:tcPr/>
+                </a:tc>
+                <a:tc>
+                  <a:txBody>
+                    <a:bodyPr/>
+                    <a:lstStyle/>
+                    <a:p>
+                      <a:r>
+                        <a:rPr lang="en-US" dirty="0"/>
+                        <a:t>0.005 cm</a:t>
+                      </a:r>
+                    </a:p>
+                  </a:txBody>
+                  <a:tcPr/>
+                </a:tc>
+                <a:tc>
+                  <a:txBody>
+                    <a:bodyPr/>
+                    <a:lstStyle/>
+                    <a:p>
+                      <a:r>
+                        <a:rPr lang="en-US" dirty="0"/>
+                        <a:t>0.880 cm</a:t>
+                      </a:r>
+                    </a:p>
+                  </a:txBody>
+                  <a:tcPr/>
+                </a:tc>
+                <a:tc>
+                  <a:txBody>
+                    <a:bodyPr/>
+                    <a:lstStyle/>
+                    <a:p>
+                      <a:r>
+                        <a:rPr lang="en-US" sz="1600" dirty="0"/>
+                        <a:t>precise to 3</a:t>
+                      </a:r>
+                      <a:r>
+                        <a:rPr lang="en-US" sz="1600" baseline="30000" dirty="0"/>
+                        <a:t>rd</a:t>
+                      </a:r>
+                      <a:r>
+                        <a:rPr lang="en-US" sz="1600" dirty="0"/>
+                        <a:t> decimal digit</a:t>
+                      </a:r>
+                    </a:p>
+                  </a:txBody>
+                  <a:tcPr/>
+                </a:tc>
+                <a:extLst>
+                  <a:ext uri="{0D108BD9-81ED-4DB2-BD59-A6C34878D82A}">
+                    <a16:rowId xmlns:a16="http://schemas.microsoft.com/office/drawing/2014/main" val="249437472"/>
+                  </a:ext>
+                </a:extLst>
+              </a:tr>
+            </a:tbl>
+          </a:graphicData>
+        </a:graphic>
+      </p:graphicFrame>
+    </p:spTree>
+    <p:extLst>
+      <p:ext uri="{BB962C8B-B14F-4D97-AF65-F5344CB8AC3E}">
+        <p14:creationId xmlns:p14="http://schemas.microsoft.com/office/powerpoint/2010/main" val="1540067363"/>
+      </p:ext>
+    </p:extLst>
   </p:cSld>
   <p:clrMapOvr>
     <a:masterClrMapping/>
@@ -12378,6 +13745,189 @@
     <p:extLst>
       <p:ext uri="{BB962C8B-B14F-4D97-AF65-F5344CB8AC3E}">
         <p14:creationId xmlns:p14="http://schemas.microsoft.com/office/powerpoint/2010/main" val="3469914632"/>
+      </p:ext>
+    </p:extLst>
+  </p:cSld>
+  <p:clrMapOvr>
+    <a:masterClrMapping/>
+  </p:clrMapOvr>
+</p:sld>
+</file>
+
+<file path=ppt/slides/slide9.xml><?xml version="1.0" encoding="utf-8"?>
+<p:sld xmlns:a="http://schemas.openxmlformats.org/drawingml/2006/main" xmlns:r="http://schemas.openxmlformats.org/officeDocument/2006/relationships" xmlns:p="http://schemas.openxmlformats.org/presentationml/2006/main">
+  <p:cSld>
+    <p:spTree>
+      <p:nvGrpSpPr>
+        <p:cNvPr id="1" name="">
+          <a:extLst>
+            <a:ext uri="{FF2B5EF4-FFF2-40B4-BE49-F238E27FC236}">
+              <a16:creationId xmlns:a16="http://schemas.microsoft.com/office/drawing/2014/main" id="{7000656A-EB43-F98F-9533-5E1A3C2982AA}"/>
+            </a:ext>
+          </a:extLst>
+        </p:cNvPr>
+        <p:cNvGrpSpPr/>
+        <p:nvPr/>
+      </p:nvGrpSpPr>
+      <p:grpSpPr>
+        <a:xfrm>
+          <a:off x="0" y="0"/>
+          <a:ext cx="0" cy="0"/>
+          <a:chOff x="0" y="0"/>
+          <a:chExt cx="0" cy="0"/>
+        </a:xfrm>
+      </p:grpSpPr>
+      <p:sp>
+        <p:nvSpPr>
+          <p:cNvPr id="2" name="Title 1">
+            <a:extLst>
+              <a:ext uri="{FF2B5EF4-FFF2-40B4-BE49-F238E27FC236}">
+                <a16:creationId xmlns:a16="http://schemas.microsoft.com/office/drawing/2014/main" id="{EA53AAA8-D467-0FAC-4407-467B090369CA}"/>
+              </a:ext>
+            </a:extLst>
+          </p:cNvPr>
+          <p:cNvSpPr>
+            <a:spLocks noGrp="1"/>
+          </p:cNvSpPr>
+          <p:nvPr>
+            <p:ph type="title"/>
+          </p:nvPr>
+        </p:nvSpPr>
+        <p:spPr>
+          <a:xfrm>
+            <a:off x="349955" y="425344"/>
+            <a:ext cx="8421512" cy="707886"/>
+          </a:xfrm>
+        </p:spPr>
+        <p:txBody>
+          <a:bodyPr/>
+          <a:lstStyle/>
+          <a:p>
+            <a:r>
+              <a:rPr lang="en-US" sz="4000" dirty="0"/>
+              <a:t>Notes on Measurement Precision</a:t>
+            </a:r>
+          </a:p>
+        </p:txBody>
+      </p:sp>
+      <p:sp>
+        <p:nvSpPr>
+          <p:cNvPr id="3" name="Content Placeholder 2">
+            <a:extLst>
+              <a:ext uri="{FF2B5EF4-FFF2-40B4-BE49-F238E27FC236}">
+                <a16:creationId xmlns:a16="http://schemas.microsoft.com/office/drawing/2014/main" id="{9F0E2130-CD07-D2B4-5D6F-978E14DF5F4A}"/>
+              </a:ext>
+            </a:extLst>
+          </p:cNvPr>
+          <p:cNvSpPr>
+            <a:spLocks noGrp="1"/>
+          </p:cNvSpPr>
+          <p:nvPr>
+            <p:ph idx="1"/>
+          </p:nvPr>
+        </p:nvSpPr>
+        <p:spPr>
+          <a:xfrm>
+            <a:off x="372533" y="3780612"/>
+            <a:ext cx="8387645" cy="2766943"/>
+          </a:xfrm>
+        </p:spPr>
+        <p:txBody>
+          <a:bodyPr/>
+          <a:lstStyle/>
+          <a:p>
+            <a:r>
+              <a:rPr lang="en-US" dirty="0"/>
+              <a:t>Look at the smallest division mark. What is its value?</a:t>
+            </a:r>
+          </a:p>
+          <a:p>
+            <a:pPr marL="231775" lvl="1" indent="0">
+              <a:buNone/>
+            </a:pPr>
+            <a:r>
+              <a:rPr lang="en-US" dirty="0">
+                <a:solidFill>
+                  <a:srgbClr val="00FF00"/>
+                </a:solidFill>
+              </a:rPr>
+              <a:t>1 mL? 0.1 mL? 0.01 mL? 0.001 mL?</a:t>
+            </a:r>
+          </a:p>
+          <a:p>
+            <a:r>
+              <a:rPr lang="en-US" dirty="0"/>
+              <a:t>Now take one-tenth of the division mark value: multiply by 0.1, by 10%; divide by 10</a:t>
+            </a:r>
+          </a:p>
+          <a:p>
+            <a:pPr marL="231775" lvl="1" indent="0">
+              <a:buNone/>
+            </a:pPr>
+            <a:r>
+              <a:rPr lang="en-US" dirty="0">
+                <a:solidFill>
+                  <a:srgbClr val="00FF00"/>
+                </a:solidFill>
+              </a:rPr>
+              <a:t>That is your precision!</a:t>
+            </a:r>
+          </a:p>
+          <a:p>
+            <a:pPr marL="231775" lvl="1" indent="0">
+              <a:buNone/>
+            </a:pPr>
+            <a:r>
+              <a:rPr lang="en-US" sz="2400" dirty="0"/>
+              <a:t>Slide 1 (a) and (b)</a:t>
+            </a:r>
+          </a:p>
+          <a:p>
+            <a:pPr marL="231775" lvl="1" indent="0">
+              <a:buNone/>
+            </a:pPr>
+            <a:endParaRPr lang="en-US" dirty="0">
+              <a:solidFill>
+                <a:srgbClr val="00FF00"/>
+              </a:solidFill>
+            </a:endParaRPr>
+          </a:p>
+        </p:txBody>
+      </p:sp>
+      <p:pic>
+        <p:nvPicPr>
+          <p:cNvPr id="5" name="Picture 4">
+            <a:extLst>
+              <a:ext uri="{FF2B5EF4-FFF2-40B4-BE49-F238E27FC236}">
+                <a16:creationId xmlns:a16="http://schemas.microsoft.com/office/drawing/2014/main" id="{6BB832E5-FD54-70CA-7C53-E4AFBBCF7E8A}"/>
+              </a:ext>
+            </a:extLst>
+          </p:cNvPr>
+          <p:cNvPicPr>
+            <a:picLocks noChangeAspect="1"/>
+          </p:cNvPicPr>
+          <p:nvPr/>
+        </p:nvPicPr>
+        <p:blipFill>
+          <a:blip r:embed="rId2"/>
+          <a:stretch>
+            <a:fillRect/>
+          </a:stretch>
+        </p:blipFill>
+        <p:spPr>
+          <a:xfrm>
+            <a:off x="2169371" y="1332090"/>
+            <a:ext cx="4434630" cy="2448522"/>
+          </a:xfrm>
+          <a:prstGeom prst="rect">
+            <a:avLst/>
+          </a:prstGeom>
+        </p:spPr>
+      </p:pic>
+    </p:spTree>
+    <p:extLst>
+      <p:ext uri="{BB962C8B-B14F-4D97-AF65-F5344CB8AC3E}">
+        <p14:creationId xmlns:p14="http://schemas.microsoft.com/office/powerpoint/2010/main" val="3578450159"/>
       </p:ext>
     </p:extLst>
   </p:cSld>

</xml_diff>